<commit_message>
[CONTRIBUTING]: Update of Figure 1
Fixing event sequence and modify outline style.

Signed-off-by: Gergely Csatari <gergely.csatari@nokia.com>
</commit_message>
<xml_diff>
--- a/artefacts/figures/pr-approval-process.pptx
+++ b/artefacts/figures/pr-approval-process.pptx
@@ -104,7 +104,97 @@
       </a:defRPr>
     </a:lvl9pPr>
   </p:defaultTextStyle>
+  <p:extLst>
+    <p:ext uri="{EFAFB233-063F-42B5-8137-9DF3F51BA10A}">
+      <p15:sldGuideLst xmlns:p15="http://schemas.microsoft.com/office/powerpoint/2012/main"/>
+    </p:ext>
+  </p:extLst>
 </p:presentation>
+</file>
+
+<file path=ppt/changesInfos/changesInfo1.xml><?xml version="1.0" encoding="utf-8"?>
+<pc:chgInfo xmlns:a="http://schemas.openxmlformats.org/drawingml/2006/main" xmlns:r="http://schemas.openxmlformats.org/officeDocument/2006/relationships" xmlns:ac="http://schemas.microsoft.com/office/drawing/2013/main/command" xmlns:pc="http://schemas.microsoft.com/office/powerpoint/2013/main/command">
+  <pc:docChgLst>
+    <pc:chgData name="Csatari, Gergely (Nokia - FI/Espoo)" userId="f5bffca3-77e4-4f86-ab35-a6eae4fbf322" providerId="ADAL" clId="{7C256A67-5AD8-42F9-ABF8-ECAE9E01B76C}"/>
+    <pc:docChg chg="modSld">
+      <pc:chgData name="Csatari, Gergely (Nokia - FI/Espoo)" userId="f5bffca3-77e4-4f86-ab35-a6eae4fbf322" providerId="ADAL" clId="{7C256A67-5AD8-42F9-ABF8-ECAE9E01B76C}" dt="2022-03-18T11:15:29.776" v="2" actId="1582"/>
+      <pc:docMkLst>
+        <pc:docMk/>
+      </pc:docMkLst>
+      <pc:sldChg chg="modSp mod">
+        <pc:chgData name="Csatari, Gergely (Nokia - FI/Espoo)" userId="f5bffca3-77e4-4f86-ab35-a6eae4fbf322" providerId="ADAL" clId="{7C256A67-5AD8-42F9-ABF8-ECAE9E01B76C}" dt="2022-03-18T11:15:29.776" v="2" actId="1582"/>
+        <pc:sldMkLst>
+          <pc:docMk/>
+          <pc:sldMk cId="331196649" sldId="256"/>
+        </pc:sldMkLst>
+        <pc:spChg chg="mod">
+          <ac:chgData name="Csatari, Gergely (Nokia - FI/Espoo)" userId="f5bffca3-77e4-4f86-ab35-a6eae4fbf322" providerId="ADAL" clId="{7C256A67-5AD8-42F9-ABF8-ECAE9E01B76C}" dt="2022-03-18T11:15:29.776" v="2" actId="1582"/>
+          <ac:spMkLst>
+            <pc:docMk/>
+            <pc:sldMk cId="331196649" sldId="256"/>
+            <ac:spMk id="14" creationId="{BA0FBEB2-3F8B-4E11-8AE2-B1C755A390DA}"/>
+          </ac:spMkLst>
+        </pc:spChg>
+        <pc:spChg chg="mod">
+          <ac:chgData name="Csatari, Gergely (Nokia - FI/Espoo)" userId="f5bffca3-77e4-4f86-ab35-a6eae4fbf322" providerId="ADAL" clId="{7C256A67-5AD8-42F9-ABF8-ECAE9E01B76C}" dt="2022-03-18T11:15:29.776" v="2" actId="1582"/>
+          <ac:spMkLst>
+            <pc:docMk/>
+            <pc:sldMk cId="331196649" sldId="256"/>
+            <ac:spMk id="32" creationId="{F0B97D92-D1A0-4A9F-BA25-C5F135622F1C}"/>
+          </ac:spMkLst>
+        </pc:spChg>
+        <pc:spChg chg="mod">
+          <ac:chgData name="Csatari, Gergely (Nokia - FI/Espoo)" userId="f5bffca3-77e4-4f86-ab35-a6eae4fbf322" providerId="ADAL" clId="{7C256A67-5AD8-42F9-ABF8-ECAE9E01B76C}" dt="2022-03-18T11:15:29.776" v="2" actId="1582"/>
+          <ac:spMkLst>
+            <pc:docMk/>
+            <pc:sldMk cId="331196649" sldId="256"/>
+            <ac:spMk id="51" creationId="{8A264777-C3BB-4899-968F-2F51D6D22BDA}"/>
+          </ac:spMkLst>
+        </pc:spChg>
+        <pc:spChg chg="mod">
+          <ac:chgData name="Csatari, Gergely (Nokia - FI/Espoo)" userId="f5bffca3-77e4-4f86-ab35-a6eae4fbf322" providerId="ADAL" clId="{7C256A67-5AD8-42F9-ABF8-ECAE9E01B76C}" dt="2022-03-18T11:15:29.776" v="2" actId="1582"/>
+          <ac:spMkLst>
+            <pc:docMk/>
+            <pc:sldMk cId="331196649" sldId="256"/>
+            <ac:spMk id="69" creationId="{3531C537-7745-489A-8CC0-F99C765BE388}"/>
+          </ac:spMkLst>
+        </pc:spChg>
+        <pc:spChg chg="mod">
+          <ac:chgData name="Csatari, Gergely (Nokia - FI/Espoo)" userId="f5bffca3-77e4-4f86-ab35-a6eae4fbf322" providerId="ADAL" clId="{7C256A67-5AD8-42F9-ABF8-ECAE9E01B76C}" dt="2022-03-18T11:15:29.776" v="2" actId="1582"/>
+          <ac:spMkLst>
+            <pc:docMk/>
+            <pc:sldMk cId="331196649" sldId="256"/>
+            <ac:spMk id="70" creationId="{BA8CB075-03CA-43B9-AD6C-8D1CA689D0BC}"/>
+          </ac:spMkLst>
+        </pc:spChg>
+        <pc:spChg chg="mod">
+          <ac:chgData name="Csatari, Gergely (Nokia - FI/Espoo)" userId="f5bffca3-77e4-4f86-ab35-a6eae4fbf322" providerId="ADAL" clId="{7C256A67-5AD8-42F9-ABF8-ECAE9E01B76C}" dt="2022-03-18T11:15:29.776" v="2" actId="1582"/>
+          <ac:spMkLst>
+            <pc:docMk/>
+            <pc:sldMk cId="331196649" sldId="256"/>
+            <ac:spMk id="71" creationId="{5A62CDEC-7F28-4F9D-ADCF-76D2D958BBC3}"/>
+          </ac:spMkLst>
+        </pc:spChg>
+        <pc:spChg chg="mod">
+          <ac:chgData name="Csatari, Gergely (Nokia - FI/Espoo)" userId="f5bffca3-77e4-4f86-ab35-a6eae4fbf322" providerId="ADAL" clId="{7C256A67-5AD8-42F9-ABF8-ECAE9E01B76C}" dt="2022-03-18T11:15:29.776" v="2" actId="1582"/>
+          <ac:spMkLst>
+            <pc:docMk/>
+            <pc:sldMk cId="331196649" sldId="256"/>
+            <ac:spMk id="83" creationId="{EB542B1D-B25C-4F79-A4C6-C0761E18D553}"/>
+          </ac:spMkLst>
+        </pc:spChg>
+        <pc:spChg chg="mod">
+          <ac:chgData name="Csatari, Gergely (Nokia - FI/Espoo)" userId="f5bffca3-77e4-4f86-ab35-a6eae4fbf322" providerId="ADAL" clId="{7C256A67-5AD8-42F9-ABF8-ECAE9E01B76C}" dt="2022-03-18T11:14:49.028" v="1" actId="20577"/>
+          <ac:spMkLst>
+            <pc:docMk/>
+            <pc:sldMk cId="331196649" sldId="256"/>
+            <ac:spMk id="89" creationId="{1CA3A59C-E7F1-490E-AF9C-42CA6BF421C7}"/>
+          </ac:spMkLst>
+        </pc:spChg>
+      </pc:sldChg>
+    </pc:docChg>
+  </pc:docChgLst>
+</pc:chgInfo>
 </file>
 
 <file path=ppt/slideLayouts/slideLayout1.xml><?xml version="1.0" encoding="utf-8"?>
@@ -256,7 +346,7 @@
           <a:p>
             <a:fld id="{4D7807C7-8A67-4094-9E7E-AB2DE8D02318}" type="datetimeFigureOut">
               <a:rPr lang="en-FI" smtClean="0"/>
-              <a:t>14/03/2022</a:t>
+              <a:t>18/03/2022</a:t>
             </a:fld>
             <a:endParaRPr lang="en-FI"/>
           </a:p>
@@ -456,7 +546,7 @@
           <a:p>
             <a:fld id="{4D7807C7-8A67-4094-9E7E-AB2DE8D02318}" type="datetimeFigureOut">
               <a:rPr lang="en-FI" smtClean="0"/>
-              <a:t>14/03/2022</a:t>
+              <a:t>18/03/2022</a:t>
             </a:fld>
             <a:endParaRPr lang="en-FI"/>
           </a:p>
@@ -666,7 +756,7 @@
           <a:p>
             <a:fld id="{4D7807C7-8A67-4094-9E7E-AB2DE8D02318}" type="datetimeFigureOut">
               <a:rPr lang="en-FI" smtClean="0"/>
-              <a:t>14/03/2022</a:t>
+              <a:t>18/03/2022</a:t>
             </a:fld>
             <a:endParaRPr lang="en-FI"/>
           </a:p>
@@ -866,7 +956,7 @@
           <a:p>
             <a:fld id="{4D7807C7-8A67-4094-9E7E-AB2DE8D02318}" type="datetimeFigureOut">
               <a:rPr lang="en-FI" smtClean="0"/>
-              <a:t>14/03/2022</a:t>
+              <a:t>18/03/2022</a:t>
             </a:fld>
             <a:endParaRPr lang="en-FI"/>
           </a:p>
@@ -1142,7 +1232,7 @@
           <a:p>
             <a:fld id="{4D7807C7-8A67-4094-9E7E-AB2DE8D02318}" type="datetimeFigureOut">
               <a:rPr lang="en-FI" smtClean="0"/>
-              <a:t>14/03/2022</a:t>
+              <a:t>18/03/2022</a:t>
             </a:fld>
             <a:endParaRPr lang="en-FI"/>
           </a:p>
@@ -1410,7 +1500,7 @@
           <a:p>
             <a:fld id="{4D7807C7-8A67-4094-9E7E-AB2DE8D02318}" type="datetimeFigureOut">
               <a:rPr lang="en-FI" smtClean="0"/>
-              <a:t>14/03/2022</a:t>
+              <a:t>18/03/2022</a:t>
             </a:fld>
             <a:endParaRPr lang="en-FI"/>
           </a:p>
@@ -1825,7 +1915,7 @@
           <a:p>
             <a:fld id="{4D7807C7-8A67-4094-9E7E-AB2DE8D02318}" type="datetimeFigureOut">
               <a:rPr lang="en-FI" smtClean="0"/>
-              <a:t>14/03/2022</a:t>
+              <a:t>18/03/2022</a:t>
             </a:fld>
             <a:endParaRPr lang="en-FI"/>
           </a:p>
@@ -1967,7 +2057,7 @@
           <a:p>
             <a:fld id="{4D7807C7-8A67-4094-9E7E-AB2DE8D02318}" type="datetimeFigureOut">
               <a:rPr lang="en-FI" smtClean="0"/>
-              <a:t>14/03/2022</a:t>
+              <a:t>18/03/2022</a:t>
             </a:fld>
             <a:endParaRPr lang="en-FI"/>
           </a:p>
@@ -2080,7 +2170,7 @@
           <a:p>
             <a:fld id="{4D7807C7-8A67-4094-9E7E-AB2DE8D02318}" type="datetimeFigureOut">
               <a:rPr lang="en-FI" smtClean="0"/>
-              <a:t>14/03/2022</a:t>
+              <a:t>18/03/2022</a:t>
             </a:fld>
             <a:endParaRPr lang="en-FI"/>
           </a:p>
@@ -2393,7 +2483,7 @@
           <a:p>
             <a:fld id="{4D7807C7-8A67-4094-9E7E-AB2DE8D02318}" type="datetimeFigureOut">
               <a:rPr lang="en-FI" smtClean="0"/>
-              <a:t>14/03/2022</a:t>
+              <a:t>18/03/2022</a:t>
             </a:fld>
             <a:endParaRPr lang="en-FI"/>
           </a:p>
@@ -2682,7 +2772,7 @@
           <a:p>
             <a:fld id="{4D7807C7-8A67-4094-9E7E-AB2DE8D02318}" type="datetimeFigureOut">
               <a:rPr lang="en-FI" smtClean="0"/>
-              <a:t>14/03/2022</a:t>
+              <a:t>18/03/2022</a:t>
             </a:fld>
             <a:endParaRPr lang="en-FI"/>
           </a:p>
@@ -2925,7 +3015,7 @@
           <a:p>
             <a:fld id="{4D7807C7-8A67-4094-9E7E-AB2DE8D02318}" type="datetimeFigureOut">
               <a:rPr lang="en-FI" smtClean="0"/>
-              <a:t>14/03/2022</a:t>
+              <a:t>18/03/2022</a:t>
             </a:fld>
             <a:endParaRPr lang="en-FI"/>
           </a:p>
@@ -3625,7 +3715,7 @@
           <a:solidFill>
             <a:srgbClr val="E36386"/>
           </a:solidFill>
-          <a:ln>
+          <a:ln w="19050">
             <a:solidFill>
               <a:srgbClr val="1D1544"/>
             </a:solidFill>
@@ -3946,7 +4036,7 @@
           <a:solidFill>
             <a:srgbClr val="E36386"/>
           </a:solidFill>
-          <a:ln>
+          <a:ln w="19050">
             <a:solidFill>
               <a:srgbClr val="1D1544"/>
             </a:solidFill>
@@ -4367,7 +4457,7 @@
           <a:solidFill>
             <a:srgbClr val="E36386"/>
           </a:solidFill>
-          <a:ln>
+          <a:ln w="19050">
             <a:solidFill>
               <a:srgbClr val="1D1544"/>
             </a:solidFill>
@@ -5000,7 +5090,7 @@
           <a:solidFill>
             <a:srgbClr val="E36386"/>
           </a:solidFill>
-          <a:ln>
+          <a:ln w="19050">
             <a:solidFill>
               <a:srgbClr val="1D1544"/>
             </a:solidFill>
@@ -5065,7 +5155,7 @@
           <a:solidFill>
             <a:srgbClr val="E36386"/>
           </a:solidFill>
-          <a:ln>
+          <a:ln w="19050">
             <a:solidFill>
               <a:srgbClr val="1D1544"/>
             </a:solidFill>
@@ -5130,7 +5220,7 @@
           <a:solidFill>
             <a:srgbClr val="E36386"/>
           </a:solidFill>
-          <a:ln>
+          <a:ln w="19050">
             <a:solidFill>
               <a:srgbClr val="1D1544"/>
             </a:solidFill>
@@ -5412,7 +5502,7 @@
           <a:solidFill>
             <a:srgbClr val="E36386"/>
           </a:solidFill>
-          <a:ln>
+          <a:ln w="19050">
             <a:solidFill>
               <a:srgbClr val="1D1544"/>
             </a:solidFill>
@@ -5600,7 +5690,7 @@
             <a:pPr algn="ctr"/>
             <a:r>
               <a:rPr lang="en-US" sz="1400" dirty="0"/>
-              <a:t>5</a:t>
+              <a:t>6</a:t>
             </a:r>
             <a:endParaRPr lang="en-FI" sz="1400" dirty="0"/>
           </a:p>

</xml_diff>